<commit_message>
Update Make Programming Sexy.pptx
</commit_message>
<xml_diff>
--- a/Pitch_Presi/Make Programming Sexy.pptx
+++ b/Pitch_Presi/Make Programming Sexy.pptx
@@ -107,6 +107,11 @@
       </a:defRPr>
     </a:lvl9pPr>
   </p:defaultTextStyle>
+  <p:extLst>
+    <p:ext uri="{EFAFB233-063F-42B5-8137-9DF3F51BA10A}">
+      <p15:sldGuideLst xmlns:p15="http://schemas.microsoft.com/office/powerpoint/2012/main"/>
+    </p:ext>
+  </p:extLst>
 </p:presentation>
 </file>
 
@@ -259,7 +264,7 @@
           <a:p>
             <a:fld id="{36E7A62E-909C-4F06-9250-BC95460A9284}" type="datetimeFigureOut">
               <a:rPr lang="de-CH" smtClean="0"/>
-              <a:t>29.09.2019</a:t>
+              <a:t>29.09.19</a:t>
             </a:fld>
             <a:endParaRPr lang="de-CH"/>
           </a:p>
@@ -459,7 +464,7 @@
           <a:p>
             <a:fld id="{36E7A62E-909C-4F06-9250-BC95460A9284}" type="datetimeFigureOut">
               <a:rPr lang="de-CH" smtClean="0"/>
-              <a:t>29.09.2019</a:t>
+              <a:t>29.09.19</a:t>
             </a:fld>
             <a:endParaRPr lang="de-CH"/>
           </a:p>
@@ -669,7 +674,7 @@
           <a:p>
             <a:fld id="{36E7A62E-909C-4F06-9250-BC95460A9284}" type="datetimeFigureOut">
               <a:rPr lang="de-CH" smtClean="0"/>
-              <a:t>29.09.2019</a:t>
+              <a:t>29.09.19</a:t>
             </a:fld>
             <a:endParaRPr lang="de-CH"/>
           </a:p>
@@ -869,7 +874,7 @@
           <a:p>
             <a:fld id="{36E7A62E-909C-4F06-9250-BC95460A9284}" type="datetimeFigureOut">
               <a:rPr lang="de-CH" smtClean="0"/>
-              <a:t>29.09.2019</a:t>
+              <a:t>29.09.19</a:t>
             </a:fld>
             <a:endParaRPr lang="de-CH"/>
           </a:p>
@@ -1145,7 +1150,7 @@
           <a:p>
             <a:fld id="{36E7A62E-909C-4F06-9250-BC95460A9284}" type="datetimeFigureOut">
               <a:rPr lang="de-CH" smtClean="0"/>
-              <a:t>29.09.2019</a:t>
+              <a:t>29.09.19</a:t>
             </a:fld>
             <a:endParaRPr lang="de-CH"/>
           </a:p>
@@ -1413,7 +1418,7 @@
           <a:p>
             <a:fld id="{36E7A62E-909C-4F06-9250-BC95460A9284}" type="datetimeFigureOut">
               <a:rPr lang="de-CH" smtClean="0"/>
-              <a:t>29.09.2019</a:t>
+              <a:t>29.09.19</a:t>
             </a:fld>
             <a:endParaRPr lang="de-CH"/>
           </a:p>
@@ -1828,7 +1833,7 @@
           <a:p>
             <a:fld id="{36E7A62E-909C-4F06-9250-BC95460A9284}" type="datetimeFigureOut">
               <a:rPr lang="de-CH" smtClean="0"/>
-              <a:t>29.09.2019</a:t>
+              <a:t>29.09.19</a:t>
             </a:fld>
             <a:endParaRPr lang="de-CH"/>
           </a:p>
@@ -1970,7 +1975,7 @@
           <a:p>
             <a:fld id="{36E7A62E-909C-4F06-9250-BC95460A9284}" type="datetimeFigureOut">
               <a:rPr lang="de-CH" smtClean="0"/>
-              <a:t>29.09.2019</a:t>
+              <a:t>29.09.19</a:t>
             </a:fld>
             <a:endParaRPr lang="de-CH"/>
           </a:p>
@@ -2083,7 +2088,7 @@
           <a:p>
             <a:fld id="{36E7A62E-909C-4F06-9250-BC95460A9284}" type="datetimeFigureOut">
               <a:rPr lang="de-CH" smtClean="0"/>
-              <a:t>29.09.2019</a:t>
+              <a:t>29.09.19</a:t>
             </a:fld>
             <a:endParaRPr lang="de-CH"/>
           </a:p>
@@ -2396,7 +2401,7 @@
           <a:p>
             <a:fld id="{36E7A62E-909C-4F06-9250-BC95460A9284}" type="datetimeFigureOut">
               <a:rPr lang="de-CH" smtClean="0"/>
-              <a:t>29.09.2019</a:t>
+              <a:t>29.09.19</a:t>
             </a:fld>
             <a:endParaRPr lang="de-CH"/>
           </a:p>
@@ -2685,7 +2690,7 @@
           <a:p>
             <a:fld id="{36E7A62E-909C-4F06-9250-BC95460A9284}" type="datetimeFigureOut">
               <a:rPr lang="de-CH" smtClean="0"/>
-              <a:t>29.09.2019</a:t>
+              <a:t>29.09.19</a:t>
             </a:fld>
             <a:endParaRPr lang="de-CH"/>
           </a:p>
@@ -2928,7 +2933,7 @@
           <a:p>
             <a:fld id="{36E7A62E-909C-4F06-9250-BC95460A9284}" type="datetimeFigureOut">
               <a:rPr lang="de-CH" smtClean="0"/>
-              <a:t>29.09.2019</a:t>
+              <a:t>29.09.19</a:t>
             </a:fld>
             <a:endParaRPr lang="de-CH"/>
           </a:p>
@@ -3689,13 +3694,13 @@
         <p:spPr/>
         <p:txBody>
           <a:bodyPr>
-            <a:normAutofit fontScale="90000"/>
+            <a:normAutofit/>
           </a:bodyPr>
           <a:lstStyle/>
           <a:p>
             <a:r>
               <a:rPr lang="de-CH" dirty="0"/>
-              <a:t>Journey (Stacey Matrix) http://www.agile-minds.com/when-to-use-waterfall-when-agile/</a:t>
+              <a:t>Journey (Stacey Matrix)</a:t>
             </a:r>
           </a:p>
         </p:txBody>
@@ -3736,6 +3741,90 @@
           </a:prstGeom>
         </p:spPr>
       </p:pic>
+      <p:sp>
+        <p:nvSpPr>
+          <p:cNvPr id="4" name="Textfeld 3">
+            <a:extLst>
+              <a:ext uri="{FF2B5EF4-FFF2-40B4-BE49-F238E27FC236}">
+                <a16:creationId xmlns:a16="http://schemas.microsoft.com/office/drawing/2014/main" id="{D492A90C-C361-754D-8B4E-5F72102FA755}"/>
+              </a:ext>
+            </a:extLst>
+          </p:cNvPr>
+          <p:cNvSpPr txBox="1"/>
+          <p:nvPr/>
+        </p:nvSpPr>
+        <p:spPr>
+          <a:xfrm>
+            <a:off x="3826808" y="5780600"/>
+            <a:ext cx="4917372" cy="307777"/>
+          </a:xfrm>
+          <a:prstGeom prst="rect">
+            <a:avLst/>
+          </a:prstGeom>
+          <a:noFill/>
+        </p:spPr>
+        <p:txBody>
+          <a:bodyPr wrap="none" rtlCol="0">
+            <a:spAutoFit/>
+          </a:bodyPr>
+          <a:lstStyle/>
+          <a:p>
+            <a:r>
+              <a:rPr lang="de-CH" sz="1400" i="1" dirty="0"/>
+              <a:t>http://</a:t>
+            </a:r>
+            <a:r>
+              <a:rPr lang="de-CH" sz="1400" i="1" dirty="0" err="1"/>
+              <a:t>www.agile-minds.com</a:t>
+            </a:r>
+            <a:r>
+              <a:rPr lang="de-CH" sz="1400" i="1" dirty="0"/>
+              <a:t>/</a:t>
+            </a:r>
+            <a:r>
+              <a:rPr lang="de-CH" sz="1400" i="1" dirty="0" err="1"/>
+              <a:t>when</a:t>
+            </a:r>
+            <a:r>
+              <a:rPr lang="de-CH" sz="1400" i="1" dirty="0"/>
+              <a:t>-</a:t>
+            </a:r>
+            <a:r>
+              <a:rPr lang="de-CH" sz="1400" i="1" dirty="0" err="1"/>
+              <a:t>to</a:t>
+            </a:r>
+            <a:r>
+              <a:rPr lang="de-CH" sz="1400" i="1" dirty="0"/>
+              <a:t>-</a:t>
+            </a:r>
+            <a:r>
+              <a:rPr lang="de-CH" sz="1400" i="1" dirty="0" err="1"/>
+              <a:t>use</a:t>
+            </a:r>
+            <a:r>
+              <a:rPr lang="de-CH" sz="1400" i="1" dirty="0"/>
+              <a:t>-</a:t>
+            </a:r>
+            <a:r>
+              <a:rPr lang="de-CH" sz="1400" i="1" dirty="0" err="1"/>
+              <a:t>waterfall</a:t>
+            </a:r>
+            <a:r>
+              <a:rPr lang="de-CH" sz="1400" i="1" dirty="0"/>
+              <a:t>-</a:t>
+            </a:r>
+            <a:r>
+              <a:rPr lang="de-CH" sz="1400" i="1" dirty="0" err="1"/>
+              <a:t>when</a:t>
+            </a:r>
+            <a:r>
+              <a:rPr lang="de-CH" sz="1400" i="1" dirty="0"/>
+              <a:t>-agile/</a:t>
+            </a:r>
+            <a:endParaRPr lang="de-DE" sz="1400" i="1" dirty="0"/>
+          </a:p>
+        </p:txBody>
+      </p:sp>
     </p:spTree>
     <p:extLst>
       <p:ext uri="{BB962C8B-B14F-4D97-AF65-F5344CB8AC3E}">

</xml_diff>